<commit_message>
Praesentation Folie "Ausblick" hinzugefügt!
</commit_message>
<xml_diff>
--- a/docs/Präsentation/2D RTS-Spiel (Ancient Legends).pptx
+++ b/docs/Präsentation/2D RTS-Spiel (Ancient Legends).pptx
@@ -5,10 +5,10 @@
     <p:sldMasterId id="2147483648" r:id="rId1"/>
   </p:sldMasterIdLst>
   <p:notesMasterIdLst>
-    <p:notesMasterId r:id="rId13"/>
+    <p:notesMasterId r:id="rId14"/>
   </p:notesMasterIdLst>
   <p:handoutMasterIdLst>
-    <p:handoutMasterId r:id="rId14"/>
+    <p:handoutMasterId r:id="rId15"/>
   </p:handoutMasterIdLst>
   <p:sldIdLst>
     <p:sldId id="256" r:id="rId2"/>
@@ -20,8 +20,9 @@
     <p:sldId id="259" r:id="rId8"/>
     <p:sldId id="260" r:id="rId9"/>
     <p:sldId id="261" r:id="rId10"/>
-    <p:sldId id="275" r:id="rId11"/>
-    <p:sldId id="277" r:id="rId12"/>
+    <p:sldId id="280" r:id="rId11"/>
+    <p:sldId id="275" r:id="rId12"/>
+    <p:sldId id="277" r:id="rId13"/>
   </p:sldIdLst>
   <p:sldSz cx="9144000" cy="6858000" type="screen4x3"/>
   <p:notesSz cx="6946900" cy="9283700"/>
@@ -643,7 +644,7 @@
         <p:nvSpPr>
           <p:cNvPr id="24580" name="Rectangle 4"/>
           <p:cNvSpPr>
-            <a:spLocks noChangeArrowheads="1" noTextEdit="1"/>
+            <a:spLocks noGrp="1" noRot="1" noChangeAspect="1" noChangeArrowheads="1" noTextEdit="1"/>
           </p:cNvSpPr>
           <p:nvPr>
             <p:ph type="sldImg" idx="2"/>
@@ -1104,7 +1105,7 @@
         <p:nvSpPr>
           <p:cNvPr id="35842" name="Rectangle 2"/>
           <p:cNvSpPr>
-            <a:spLocks noChangeArrowheads="1" noTextEdit="1"/>
+            <a:spLocks noGrp="1" noRot="1" noChangeAspect="1" noChangeArrowheads="1" noTextEdit="1"/>
           </p:cNvSpPr>
           <p:nvPr>
             <p:ph type="sldImg"/>
@@ -1201,7 +1202,7 @@
           <a:bodyPr/>
           <a:lstStyle/>
           <a:p>
-            <a:fld id="{111BA4A0-C455-4DEF-BB15-D63B8668D556}" type="slidenum">
+            <a:fld id="{6F9630C5-B121-4835-AE30-AAD87F6A8923}" type="slidenum">
               <a:rPr lang="de-DE" altLang="de-DE"/>
               <a:pPr/>
               <a:t>10</a:t>
@@ -1212,9 +1213,9 @@
       </p:sp>
       <p:sp>
         <p:nvSpPr>
-          <p:cNvPr id="55298" name="Rectangle 2"/>
-          <p:cNvSpPr>
-            <a:spLocks noChangeArrowheads="1" noTextEdit="1"/>
+          <p:cNvPr id="39938" name="Rectangle 2"/>
+          <p:cNvSpPr>
+            <a:spLocks noGrp="1" noRot="1" noChangeAspect="1" noChangeArrowheads="1" noTextEdit="1"/>
           </p:cNvSpPr>
           <p:nvPr>
             <p:ph type="sldImg"/>
@@ -1226,7 +1227,7 @@
       </p:sp>
       <p:sp>
         <p:nvSpPr>
-          <p:cNvPr id="55299" name="Rectangle 3"/>
+          <p:cNvPr id="39939" name="Rectangle 3"/>
           <p:cNvSpPr>
             <a:spLocks noGrp="1" noChangeArrowheads="1"/>
           </p:cNvSpPr>
@@ -1239,10 +1240,57 @@
           <a:bodyPr/>
           <a:lstStyle/>
           <a:p>
+            <a:pPr marL="0" marR="0" indent="0" algn="l" defTabSz="914400" rtl="0" eaLnBrk="0" fontAlgn="base" latinLnBrk="0" hangingPunct="0">
+              <a:lnSpc>
+                <a:spcPct val="100000"/>
+              </a:lnSpc>
+              <a:spcBef>
+                <a:spcPct val="30000"/>
+              </a:spcBef>
+              <a:spcAft>
+                <a:spcPct val="0"/>
+              </a:spcAft>
+              <a:buClrTx/>
+              <a:buSzTx/>
+              <a:buFontTx/>
+              <a:buNone/>
+              <a:tabLst/>
+              <a:defRPr/>
+            </a:pPr>
             <a:r>
               <a:rPr lang="de-DE" altLang="de-DE" dirty="0" smtClean="0"/>
-              <a:t>ALLE</a:t>
-            </a:r>
+              <a:t>DOMINIK</a:t>
+            </a:r>
+          </a:p>
+          <a:p>
+            <a:pPr marL="0" marR="0" indent="0" algn="l" defTabSz="914400" rtl="0" eaLnBrk="0" fontAlgn="base" latinLnBrk="0" hangingPunct="0">
+              <a:lnSpc>
+                <a:spcPct val="100000"/>
+              </a:lnSpc>
+              <a:spcBef>
+                <a:spcPct val="30000"/>
+              </a:spcBef>
+              <a:spcAft>
+                <a:spcPct val="0"/>
+              </a:spcAft>
+              <a:buClrTx/>
+              <a:buSzTx/>
+              <a:buFontTx/>
+              <a:buNone/>
+              <a:tabLst/>
+              <a:defRPr/>
+            </a:pPr>
+            <a:r>
+              <a:rPr lang="de-DE" altLang="de-DE" dirty="0" smtClean="0"/>
+              <a:t>Nicht</a:t>
+            </a:r>
+            <a:r>
+              <a:rPr lang="de-DE" altLang="de-DE" baseline="0" dirty="0" smtClean="0"/>
+              <a:t> sagen was wir alles nicht haben!!!!</a:t>
+            </a:r>
+            <a:endParaRPr lang="de-DE" altLang="de-DE" dirty="0" smtClean="0"/>
+          </a:p>
+          <a:p>
             <a:endParaRPr lang="de-DE" altLang="de-DE" dirty="0"/>
           </a:p>
         </p:txBody>
@@ -1302,7 +1350,95 @@
         <p:nvSpPr>
           <p:cNvPr id="55298" name="Rectangle 2"/>
           <p:cNvSpPr>
-            <a:spLocks noChangeArrowheads="1" noTextEdit="1"/>
+            <a:spLocks noGrp="1" noRot="1" noChangeAspect="1" noChangeArrowheads="1" noTextEdit="1"/>
+          </p:cNvSpPr>
+          <p:nvPr>
+            <p:ph type="sldImg"/>
+          </p:nvPr>
+        </p:nvSpPr>
+        <p:spPr>
+          <a:ln/>
+        </p:spPr>
+      </p:sp>
+      <p:sp>
+        <p:nvSpPr>
+          <p:cNvPr id="55299" name="Rectangle 3"/>
+          <p:cNvSpPr>
+            <a:spLocks noGrp="1" noChangeArrowheads="1"/>
+          </p:cNvSpPr>
+          <p:nvPr>
+            <p:ph type="body" idx="1"/>
+          </p:nvPr>
+        </p:nvSpPr>
+        <p:spPr/>
+        <p:txBody>
+          <a:bodyPr/>
+          <a:lstStyle/>
+          <a:p>
+            <a:r>
+              <a:rPr lang="de-DE" altLang="de-DE" dirty="0" smtClean="0"/>
+              <a:t>ALLE</a:t>
+            </a:r>
+            <a:endParaRPr lang="de-DE" altLang="de-DE" dirty="0"/>
+          </a:p>
+        </p:txBody>
+      </p:sp>
+    </p:spTree>
+  </p:cSld>
+  <p:clrMapOvr>
+    <a:masterClrMapping/>
+  </p:clrMapOvr>
+</p:notes>
+</file>
+
+<file path=ppt/notesSlides/notesSlide12.xml><?xml version="1.0" encoding="utf-8"?>
+<p:notes xmlns:a="http://schemas.openxmlformats.org/drawingml/2006/main" xmlns:r="http://schemas.openxmlformats.org/officeDocument/2006/relationships" xmlns:p="http://schemas.openxmlformats.org/presentationml/2006/main">
+  <p:cSld>
+    <p:spTree>
+      <p:nvGrpSpPr>
+        <p:cNvPr id="1" name=""/>
+        <p:cNvGrpSpPr/>
+        <p:nvPr/>
+      </p:nvGrpSpPr>
+      <p:grpSpPr>
+        <a:xfrm>
+          <a:off x="0" y="0"/>
+          <a:ext cx="0" cy="0"/>
+          <a:chOff x="0" y="0"/>
+          <a:chExt cx="0" cy="0"/>
+        </a:xfrm>
+      </p:grpSpPr>
+      <p:sp>
+        <p:nvSpPr>
+          <p:cNvPr id="7" name="Rectangle 7"/>
+          <p:cNvSpPr>
+            <a:spLocks noGrp="1" noChangeArrowheads="1"/>
+          </p:cNvSpPr>
+          <p:nvPr>
+            <p:ph type="sldNum" sz="quarter" idx="5"/>
+          </p:nvPr>
+        </p:nvSpPr>
+        <p:spPr>
+          <a:ln/>
+        </p:spPr>
+        <p:txBody>
+          <a:bodyPr/>
+          <a:lstStyle/>
+          <a:p>
+            <a:fld id="{111BA4A0-C455-4DEF-BB15-D63B8668D556}" type="slidenum">
+              <a:rPr lang="de-DE" altLang="de-DE"/>
+              <a:pPr/>
+              <a:t>12</a:t>
+            </a:fld>
+            <a:endParaRPr lang="de-DE" altLang="de-DE"/>
+          </a:p>
+        </p:txBody>
+      </p:sp>
+      <p:sp>
+        <p:nvSpPr>
+          <p:cNvPr id="55298" name="Rectangle 2"/>
+          <p:cNvSpPr>
+            <a:spLocks noGrp="1" noRot="1" noChangeAspect="1" noChangeArrowheads="1" noTextEdit="1"/>
           </p:cNvSpPr>
           <p:nvPr>
             <p:ph type="sldImg"/>
@@ -1488,7 +1624,7 @@
         <p:nvSpPr>
           <p:cNvPr id="36866" name="Rectangle 2"/>
           <p:cNvSpPr>
-            <a:spLocks noChangeArrowheads="1" noTextEdit="1"/>
+            <a:spLocks noGrp="1" noRot="1" noChangeAspect="1" noChangeArrowheads="1" noTextEdit="1"/>
           </p:cNvSpPr>
           <p:nvPr>
             <p:ph type="sldImg"/>
@@ -1576,7 +1712,7 @@
         <p:nvSpPr>
           <p:cNvPr id="37890" name="Rectangle 2"/>
           <p:cNvSpPr>
-            <a:spLocks noChangeArrowheads="1" noTextEdit="1"/>
+            <a:spLocks noGrp="1" noRot="1" noChangeAspect="1" noChangeArrowheads="1" noTextEdit="1"/>
           </p:cNvSpPr>
           <p:nvPr>
             <p:ph type="sldImg"/>
@@ -1674,7 +1810,7 @@
         <p:nvSpPr>
           <p:cNvPr id="37890" name="Rectangle 2"/>
           <p:cNvSpPr>
-            <a:spLocks noChangeArrowheads="1" noTextEdit="1"/>
+            <a:spLocks noGrp="1" noRot="1" noChangeAspect="1" noChangeArrowheads="1" noTextEdit="1"/>
           </p:cNvSpPr>
           <p:nvPr>
             <p:ph type="sldImg"/>
@@ -1809,7 +1945,7 @@
         <p:nvSpPr>
           <p:cNvPr id="37890" name="Rectangle 2"/>
           <p:cNvSpPr>
-            <a:spLocks noChangeArrowheads="1" noTextEdit="1"/>
+            <a:spLocks noGrp="1" noRot="1" noChangeAspect="1" noChangeArrowheads="1" noTextEdit="1"/>
           </p:cNvSpPr>
           <p:nvPr>
             <p:ph type="sldImg"/>
@@ -1944,7 +2080,7 @@
         <p:nvSpPr>
           <p:cNvPr id="38914" name="Rectangle 2"/>
           <p:cNvSpPr>
-            <a:spLocks noChangeArrowheads="1" noTextEdit="1"/>
+            <a:spLocks noGrp="1" noRot="1" noChangeAspect="1" noChangeArrowheads="1" noTextEdit="1"/>
           </p:cNvSpPr>
           <p:nvPr>
             <p:ph type="sldImg"/>
@@ -2079,7 +2215,7 @@
         <p:nvSpPr>
           <p:cNvPr id="39938" name="Rectangle 2"/>
           <p:cNvSpPr>
-            <a:spLocks noChangeArrowheads="1" noTextEdit="1"/>
+            <a:spLocks noGrp="1" noRot="1" noChangeAspect="1" noChangeArrowheads="1" noTextEdit="1"/>
           </p:cNvSpPr>
           <p:nvPr>
             <p:ph type="sldImg"/>
@@ -2214,7 +2350,7 @@
         <p:nvSpPr>
           <p:cNvPr id="40962" name="Rectangle 2"/>
           <p:cNvSpPr>
-            <a:spLocks noChangeArrowheads="1" noTextEdit="1"/>
+            <a:spLocks noGrp="1" noRot="1" noChangeAspect="1" noChangeArrowheads="1" noTextEdit="1"/>
           </p:cNvSpPr>
           <p:nvPr>
             <p:ph type="sldImg"/>
@@ -2370,7 +2506,7 @@
           <a:p>
             <a:fld id="{7FD3BA73-D315-4B78-86CF-24A60B8E1A22}" type="datetime1">
               <a:rPr lang="de-DE" altLang="de-DE" smtClean="0"/>
-              <a:t>13.01.2016</a:t>
+              <a:t>19.01.2016</a:t>
             </a:fld>
             <a:endParaRPr lang="de-DE" altLang="de-DE"/>
           </a:p>
@@ -2432,13 +2568,13 @@
   <p:clrMapOvr>
     <a:masterClrMapping/>
   </p:clrMapOvr>
-  <mc:AlternateContent xmlns:mc="http://schemas.openxmlformats.org/markup-compatibility/2006">
-    <mc:Choice xmlns:p14="http://schemas.microsoft.com/office/powerpoint/2010/main" Requires="p14">
+  <mc:AlternateContent xmlns:mc="http://schemas.openxmlformats.org/markup-compatibility/2006" xmlns:p14="http://schemas.microsoft.com/office/powerpoint/2010/main">
+    <mc:Choice Requires="p14">
       <p:transition spd="slow">
         <p14:gallery dir="l"/>
       </p:transition>
     </mc:Choice>
-    <mc:Fallback>
+    <mc:Fallback xmlns="">
       <p:transition spd="slow">
         <p:fade/>
       </p:transition>
@@ -2560,7 +2696,7 @@
           <a:p>
             <a:fld id="{D82F7BD3-59CF-4788-B74F-98BAC98EB260}" type="datetime1">
               <a:rPr lang="de-DE" altLang="de-DE" smtClean="0"/>
-              <a:t>13.01.2016</a:t>
+              <a:t>19.01.2016</a:t>
             </a:fld>
             <a:endParaRPr lang="de-DE" altLang="de-DE"/>
           </a:p>
@@ -2627,13 +2763,13 @@
   <p:clrMapOvr>
     <a:masterClrMapping/>
   </p:clrMapOvr>
-  <mc:AlternateContent xmlns:mc="http://schemas.openxmlformats.org/markup-compatibility/2006">
-    <mc:Choice xmlns:p14="http://schemas.microsoft.com/office/powerpoint/2010/main" Requires="p14">
+  <mc:AlternateContent xmlns:mc="http://schemas.openxmlformats.org/markup-compatibility/2006" xmlns:p14="http://schemas.microsoft.com/office/powerpoint/2010/main">
+    <mc:Choice Requires="p14">
       <p:transition spd="slow">
         <p14:gallery dir="l"/>
       </p:transition>
     </mc:Choice>
-    <mc:Fallback>
+    <mc:Fallback xmlns="">
       <p:transition spd="slow">
         <p:fade/>
       </p:transition>
@@ -2765,7 +2901,7 @@
           <a:p>
             <a:fld id="{7F357F38-C5BB-48F2-B20C-E35D0060614C}" type="datetime1">
               <a:rPr lang="de-DE" altLang="de-DE" smtClean="0"/>
-              <a:t>13.01.2016</a:t>
+              <a:t>19.01.2016</a:t>
             </a:fld>
             <a:endParaRPr lang="de-DE" altLang="de-DE"/>
           </a:p>
@@ -2832,13 +2968,13 @@
   <p:clrMapOvr>
     <a:masterClrMapping/>
   </p:clrMapOvr>
-  <mc:AlternateContent xmlns:mc="http://schemas.openxmlformats.org/markup-compatibility/2006">
-    <mc:Choice xmlns:p14="http://schemas.microsoft.com/office/powerpoint/2010/main" Requires="p14">
+  <mc:AlternateContent xmlns:mc="http://schemas.openxmlformats.org/markup-compatibility/2006" xmlns:p14="http://schemas.microsoft.com/office/powerpoint/2010/main">
+    <mc:Choice Requires="p14">
       <p:transition spd="slow">
         <p14:gallery dir="l"/>
       </p:transition>
     </mc:Choice>
-    <mc:Fallback>
+    <mc:Fallback xmlns="">
       <p:transition spd="slow">
         <p:fade/>
       </p:transition>
@@ -2960,7 +3096,7 @@
           <a:p>
             <a:fld id="{D22D03EE-0B7E-41A0-B9EF-801B32E699AA}" type="datetime1">
               <a:rPr lang="de-DE" altLang="de-DE" smtClean="0"/>
-              <a:t>13.01.2016</a:t>
+              <a:t>19.01.2016</a:t>
             </a:fld>
             <a:endParaRPr lang="de-DE" altLang="de-DE"/>
           </a:p>
@@ -3027,13 +3163,13 @@
   <p:clrMapOvr>
     <a:masterClrMapping/>
   </p:clrMapOvr>
-  <mc:AlternateContent xmlns:mc="http://schemas.openxmlformats.org/markup-compatibility/2006">
-    <mc:Choice xmlns:p14="http://schemas.microsoft.com/office/powerpoint/2010/main" Requires="p14">
+  <mc:AlternateContent xmlns:mc="http://schemas.openxmlformats.org/markup-compatibility/2006" xmlns:p14="http://schemas.microsoft.com/office/powerpoint/2010/main">
+    <mc:Choice Requires="p14">
       <p:transition spd="slow">
         <p14:gallery dir="l"/>
       </p:transition>
     </mc:Choice>
-    <mc:Fallback>
+    <mc:Fallback xmlns="">
       <p:transition spd="slow">
         <p:fade/>
       </p:transition>
@@ -3177,7 +3313,7 @@
           <a:p>
             <a:fld id="{D0E3D500-C9DE-40D6-BE17-04F487F65533}" type="datetime1">
               <a:rPr lang="de-DE" altLang="de-DE" smtClean="0"/>
-              <a:t>13.01.2016</a:t>
+              <a:t>19.01.2016</a:t>
             </a:fld>
             <a:endParaRPr lang="de-DE" altLang="de-DE"/>
           </a:p>
@@ -3244,13 +3380,13 @@
   <p:clrMapOvr>
     <a:masterClrMapping/>
   </p:clrMapOvr>
-  <mc:AlternateContent xmlns:mc="http://schemas.openxmlformats.org/markup-compatibility/2006">
-    <mc:Choice xmlns:p14="http://schemas.microsoft.com/office/powerpoint/2010/main" Requires="p14">
+  <mc:AlternateContent xmlns:mc="http://schemas.openxmlformats.org/markup-compatibility/2006" xmlns:p14="http://schemas.microsoft.com/office/powerpoint/2010/main">
+    <mc:Choice Requires="p14">
       <p:transition spd="slow">
         <p14:gallery dir="l"/>
       </p:transition>
     </mc:Choice>
-    <mc:Fallback>
+    <mc:Fallback xmlns="">
       <p:transition spd="slow">
         <p:fade/>
       </p:transition>
@@ -3490,7 +3626,7 @@
           <a:p>
             <a:fld id="{52E39DF9-BBAF-4E41-948D-D9B183151846}" type="datetime1">
               <a:rPr lang="de-DE" altLang="de-DE" smtClean="0"/>
-              <a:t>13.01.2016</a:t>
+              <a:t>19.01.2016</a:t>
             </a:fld>
             <a:endParaRPr lang="de-DE" altLang="de-DE"/>
           </a:p>
@@ -3557,13 +3693,13 @@
   <p:clrMapOvr>
     <a:masterClrMapping/>
   </p:clrMapOvr>
-  <mc:AlternateContent xmlns:mc="http://schemas.openxmlformats.org/markup-compatibility/2006">
-    <mc:Choice xmlns:p14="http://schemas.microsoft.com/office/powerpoint/2010/main" Requires="p14">
+  <mc:AlternateContent xmlns:mc="http://schemas.openxmlformats.org/markup-compatibility/2006" xmlns:p14="http://schemas.microsoft.com/office/powerpoint/2010/main">
+    <mc:Choice Requires="p14">
       <p:transition spd="slow">
         <p14:gallery dir="l"/>
       </p:transition>
     </mc:Choice>
-    <mc:Fallback>
+    <mc:Fallback xmlns="">
       <p:transition spd="slow">
         <p:fade/>
       </p:transition>
@@ -3942,7 +4078,7 @@
           <a:p>
             <a:fld id="{8EA7912E-6F34-451A-B49E-FCD248A48FEB}" type="datetime1">
               <a:rPr lang="de-DE" altLang="de-DE" smtClean="0"/>
-              <a:t>13.01.2016</a:t>
+              <a:t>19.01.2016</a:t>
             </a:fld>
             <a:endParaRPr lang="de-DE" altLang="de-DE"/>
           </a:p>
@@ -4009,13 +4145,13 @@
   <p:clrMapOvr>
     <a:masterClrMapping/>
   </p:clrMapOvr>
-  <mc:AlternateContent xmlns:mc="http://schemas.openxmlformats.org/markup-compatibility/2006">
-    <mc:Choice xmlns:p14="http://schemas.microsoft.com/office/powerpoint/2010/main" Requires="p14">
+  <mc:AlternateContent xmlns:mc="http://schemas.openxmlformats.org/markup-compatibility/2006" xmlns:p14="http://schemas.microsoft.com/office/powerpoint/2010/main">
+    <mc:Choice Requires="p14">
       <p:transition spd="slow">
         <p14:gallery dir="l"/>
       </p:transition>
     </mc:Choice>
-    <mc:Fallback>
+    <mc:Fallback xmlns="">
       <p:transition spd="slow">
         <p:fade/>
       </p:transition>
@@ -4085,7 +4221,7 @@
           <a:p>
             <a:fld id="{6E6D309E-A6D7-4173-8E24-4BFAE6F5C13F}" type="datetime1">
               <a:rPr lang="de-DE" altLang="de-DE" smtClean="0"/>
-              <a:t>13.01.2016</a:t>
+              <a:t>19.01.2016</a:t>
             </a:fld>
             <a:endParaRPr lang="de-DE" altLang="de-DE"/>
           </a:p>
@@ -4152,13 +4288,13 @@
   <p:clrMapOvr>
     <a:masterClrMapping/>
   </p:clrMapOvr>
-  <mc:AlternateContent xmlns:mc="http://schemas.openxmlformats.org/markup-compatibility/2006">
-    <mc:Choice xmlns:p14="http://schemas.microsoft.com/office/powerpoint/2010/main" Requires="p14">
+  <mc:AlternateContent xmlns:mc="http://schemas.openxmlformats.org/markup-compatibility/2006" xmlns:p14="http://schemas.microsoft.com/office/powerpoint/2010/main">
+    <mc:Choice Requires="p14">
       <p:transition spd="slow">
         <p14:gallery dir="l"/>
       </p:transition>
     </mc:Choice>
-    <mc:Fallback>
+    <mc:Fallback xmlns="">
       <p:transition spd="slow">
         <p:fade/>
       </p:transition>
@@ -4205,7 +4341,7 @@
           <a:p>
             <a:fld id="{230C1F0C-F14C-4998-AFE4-7759909A3B2E}" type="datetime1">
               <a:rPr lang="de-DE" altLang="de-DE" smtClean="0"/>
-              <a:t>13.01.2016</a:t>
+              <a:t>19.01.2016</a:t>
             </a:fld>
             <a:endParaRPr lang="de-DE" altLang="de-DE"/>
           </a:p>
@@ -4272,13 +4408,13 @@
   <p:clrMapOvr>
     <a:masterClrMapping/>
   </p:clrMapOvr>
-  <mc:AlternateContent xmlns:mc="http://schemas.openxmlformats.org/markup-compatibility/2006">
-    <mc:Choice xmlns:p14="http://schemas.microsoft.com/office/powerpoint/2010/main" Requires="p14">
+  <mc:AlternateContent xmlns:mc="http://schemas.openxmlformats.org/markup-compatibility/2006" xmlns:p14="http://schemas.microsoft.com/office/powerpoint/2010/main">
+    <mc:Choice Requires="p14">
       <p:transition spd="slow">
         <p14:gallery dir="l"/>
       </p:transition>
     </mc:Choice>
-    <mc:Fallback>
+    <mc:Fallback xmlns="">
       <p:transition spd="slow">
         <p:fade/>
       </p:transition>
@@ -4507,7 +4643,7 @@
           <a:p>
             <a:fld id="{B1977A81-DC6D-4931-8F47-3D1175BE718E}" type="datetime1">
               <a:rPr lang="de-DE" altLang="de-DE" smtClean="0"/>
-              <a:t>13.01.2016</a:t>
+              <a:t>19.01.2016</a:t>
             </a:fld>
             <a:endParaRPr lang="de-DE" altLang="de-DE"/>
           </a:p>
@@ -4574,13 +4710,13 @@
   <p:clrMapOvr>
     <a:masterClrMapping/>
   </p:clrMapOvr>
-  <mc:AlternateContent xmlns:mc="http://schemas.openxmlformats.org/markup-compatibility/2006">
-    <mc:Choice xmlns:p14="http://schemas.microsoft.com/office/powerpoint/2010/main" Requires="p14">
+  <mc:AlternateContent xmlns:mc="http://schemas.openxmlformats.org/markup-compatibility/2006" xmlns:p14="http://schemas.microsoft.com/office/powerpoint/2010/main">
+    <mc:Choice Requires="p14">
       <p:transition spd="slow">
         <p14:gallery dir="l"/>
       </p:transition>
     </mc:Choice>
-    <mc:Fallback>
+    <mc:Fallback xmlns="">
       <p:transition spd="slow">
         <p:fade/>
       </p:transition>
@@ -4789,7 +4925,7 @@
           <a:p>
             <a:fld id="{80BAF9A5-37C1-4581-88FE-0628647A8293}" type="datetime1">
               <a:rPr lang="de-DE" altLang="de-DE" smtClean="0"/>
-              <a:t>13.01.2016</a:t>
+              <a:t>19.01.2016</a:t>
             </a:fld>
             <a:endParaRPr lang="de-DE" altLang="de-DE"/>
           </a:p>
@@ -4856,13 +4992,13 @@
   <p:clrMapOvr>
     <a:masterClrMapping/>
   </p:clrMapOvr>
-  <mc:AlternateContent xmlns:mc="http://schemas.openxmlformats.org/markup-compatibility/2006">
-    <mc:Choice xmlns:p14="http://schemas.microsoft.com/office/powerpoint/2010/main" Requires="p14">
+  <mc:AlternateContent xmlns:mc="http://schemas.openxmlformats.org/markup-compatibility/2006" xmlns:p14="http://schemas.microsoft.com/office/powerpoint/2010/main">
+    <mc:Choice Requires="p14">
       <p:transition spd="slow">
         <p14:gallery dir="l"/>
       </p:transition>
     </mc:Choice>
-    <mc:Fallback>
+    <mc:Fallback xmlns="">
       <p:transition spd="slow">
         <p:fade/>
       </p:transition>
@@ -5135,7 +5271,7 @@
           <a:p>
             <a:fld id="{3B903AC6-5280-4E5C-A5D5-CB527A25D2CB}" type="datetime1">
               <a:rPr lang="de-DE" altLang="de-DE" smtClean="0"/>
-              <a:t>13.01.2016</a:t>
+              <a:t>19.01.2016</a:t>
             </a:fld>
             <a:endParaRPr lang="de-DE" altLang="de-DE"/>
           </a:p>
@@ -5308,13 +5444,13 @@
     <p:sldLayoutId id="2147483658" r:id="rId10"/>
     <p:sldLayoutId id="2147483659" r:id="rId11"/>
   </p:sldLayoutIdLst>
-  <mc:AlternateContent xmlns:mc="http://schemas.openxmlformats.org/markup-compatibility/2006">
-    <mc:Choice xmlns:p14="http://schemas.microsoft.com/office/powerpoint/2010/main" Requires="p14">
+  <mc:AlternateContent xmlns:mc="http://schemas.openxmlformats.org/markup-compatibility/2006" xmlns:p14="http://schemas.microsoft.com/office/powerpoint/2010/main">
+    <mc:Choice Requires="p14">
       <p:transition spd="slow">
         <p14:gallery dir="l"/>
       </p:transition>
     </mc:Choice>
-    <mc:Fallback>
+    <mc:Fallback xmlns="">
       <p:transition spd="slow">
         <p:fade/>
       </p:transition>
@@ -5893,7 +6029,7 @@
           <a:p>
             <a:fld id="{FBDD843C-F7C3-4001-B55D-6D4FE68F3441}" type="datetime1">
               <a:rPr lang="de-DE" altLang="de-DE" smtClean="0"/>
-              <a:t>13.01.2016</a:t>
+              <a:t>19.01.2016</a:t>
             </a:fld>
             <a:endParaRPr lang="de-DE" altLang="de-DE"/>
           </a:p>
@@ -5904,13 +6040,13 @@
   <p:clrMapOvr>
     <a:masterClrMapping/>
   </p:clrMapOvr>
-  <mc:AlternateContent xmlns:mc="http://schemas.openxmlformats.org/markup-compatibility/2006">
-    <mc:Choice xmlns:p14="http://schemas.microsoft.com/office/powerpoint/2010/main" Requires="p14">
+  <mc:AlternateContent xmlns:mc="http://schemas.openxmlformats.org/markup-compatibility/2006" xmlns:p14="http://schemas.microsoft.com/office/powerpoint/2010/main">
+    <mc:Choice Requires="p14">
       <p:transition spd="slow">
         <p14:gallery dir="l"/>
       </p:transition>
     </mc:Choice>
-    <mc:Fallback>
+    <mc:Fallback xmlns="">
       <p:transition spd="slow">
         <p:fade/>
       </p:transition>
@@ -5945,12 +6081,12 @@
       </p:grpSpPr>
       <p:sp>
         <p:nvSpPr>
-          <p:cNvPr id="33794" name="Rectangle 2"/>
+          <p:cNvPr id="10243" name="Rectangle 3"/>
           <p:cNvSpPr>
             <a:spLocks noGrp="1" noChangeArrowheads="1"/>
           </p:cNvSpPr>
           <p:nvPr>
-            <p:ph type="ctrTitle"/>
+            <p:ph type="title"/>
           </p:nvPr>
         </p:nvSpPr>
         <p:spPr/>
@@ -5959,19 +6095,8 @@
           <a:lstStyle/>
           <a:p>
             <a:r>
-              <a:rPr lang="de-DE" altLang="de-DE" b="1" dirty="0"/>
-              <a:t>Fragen </a:t>
-            </a:r>
-            <a:br>
-              <a:rPr lang="de-DE" altLang="de-DE" b="1" dirty="0"/>
-            </a:br>
-            <a:r>
-              <a:rPr lang="de-DE" altLang="de-DE" b="1" dirty="0"/>
-              <a:t>und </a:t>
-            </a:r>
-            <a:r>
               <a:rPr lang="de-DE" altLang="de-DE" b="1" dirty="0" smtClean="0"/>
-              <a:t>Bemerkungen?</a:t>
+              <a:t>Ausblick</a:t>
             </a:r>
             <a:endParaRPr lang="de-DE" altLang="de-DE" b="1" dirty="0"/>
           </a:p>
@@ -5979,12 +6104,65 @@
       </p:sp>
       <p:sp>
         <p:nvSpPr>
+          <p:cNvPr id="10242" name="Rectangle 2"/>
+          <p:cNvSpPr>
+            <a:spLocks noGrp="1" noChangeArrowheads="1"/>
+          </p:cNvSpPr>
+          <p:nvPr>
+            <p:ph type="body" idx="1"/>
+          </p:nvPr>
+        </p:nvSpPr>
+        <p:spPr/>
+        <p:txBody>
+          <a:bodyPr/>
+          <a:lstStyle/>
+          <a:p>
+            <a:r>
+              <a:rPr lang="de-DE" altLang="de-DE" dirty="0" smtClean="0"/>
+              <a:t>Eine KI entwickeln</a:t>
+            </a:r>
+          </a:p>
+          <a:p>
+            <a:r>
+              <a:rPr lang="de-DE" altLang="de-DE" dirty="0" smtClean="0"/>
+              <a:t>Mehr Einheiten und Gebäuden</a:t>
+            </a:r>
+          </a:p>
+          <a:p>
+            <a:r>
+              <a:rPr lang="de-DE" altLang="de-DE" dirty="0" smtClean="0"/>
+              <a:t>Implementierung von Gegenständen</a:t>
+            </a:r>
+          </a:p>
+          <a:p>
+            <a:r>
+              <a:rPr lang="de-DE" altLang="de-DE" dirty="0" smtClean="0"/>
+              <a:t>Integration der Story in den Abenteuermodus </a:t>
+            </a:r>
+          </a:p>
+          <a:p>
+            <a:r>
+              <a:rPr lang="de-DE" altLang="de-DE" dirty="0" smtClean="0"/>
+              <a:t>Verbesserungen im Bearbeitungsmodus</a:t>
+            </a:r>
+          </a:p>
+          <a:p>
+            <a:r>
+              <a:rPr lang="de-DE" altLang="de-DE" dirty="0" smtClean="0"/>
+              <a:t>Implementierung eines effizienten Pathfinding Algorithmus</a:t>
+            </a:r>
+            <a:endParaRPr lang="de-DE" altLang="de-DE" dirty="0"/>
+          </a:p>
+        </p:txBody>
+      </p:sp>
+      <p:sp>
+        <p:nvSpPr>
           <p:cNvPr id="2" name="Foliennummernplatzhalter 1"/>
           <p:cNvSpPr>
             <a:spLocks noGrp="1"/>
           </p:cNvSpPr>
           <p:nvPr>
-            <p:ph type="sldNum" sz="quarter" idx="4"/>
+            <p:ph type="sldNum" sz="quarter" idx="12"/>
           </p:nvPr>
         </p:nvSpPr>
         <p:spPr/>
@@ -5992,7 +6170,7 @@
           <a:bodyPr/>
           <a:lstStyle/>
           <a:p>
-            <a:fld id="{3364D7A2-00F1-4267-A931-7AAD54854EE4}" type="slidenum">
+            <a:fld id="{E373DA6B-82CA-44C3-879A-57D23A766413}" type="slidenum">
               <a:rPr lang="de-DE" altLang="de-DE" smtClean="0"/>
               <a:pPr/>
               <a:t>10</a:t>
@@ -6003,12 +6181,12 @@
       </p:sp>
       <p:sp>
         <p:nvSpPr>
-          <p:cNvPr id="5" name="Datumsplatzhalter 4"/>
+          <p:cNvPr id="3" name="Datumsplatzhalter 2"/>
           <p:cNvSpPr>
             <a:spLocks noGrp="1"/>
           </p:cNvSpPr>
           <p:nvPr>
-            <p:ph type="dt" sz="quarter" idx="2"/>
+            <p:ph type="dt" sz="quarter" idx="10"/>
           </p:nvPr>
         </p:nvSpPr>
         <p:spPr/>
@@ -6016,26 +6194,31 @@
           <a:bodyPr/>
           <a:lstStyle/>
           <a:p>
-            <a:fld id="{16479477-0FB3-4EC0-B49B-BAAE02E274CF}" type="datetime1">
+            <a:fld id="{88848E1F-B09B-423A-99BF-D02498DB76CD}" type="datetime1">
               <a:rPr lang="de-DE" altLang="de-DE" smtClean="0"/>
-              <a:t>13.01.2016</a:t>
+              <a:t>19.01.2016</a:t>
             </a:fld>
             <a:endParaRPr lang="de-DE" altLang="de-DE"/>
           </a:p>
         </p:txBody>
       </p:sp>
     </p:spTree>
+    <p:extLst>
+      <p:ext uri="{BB962C8B-B14F-4D97-AF65-F5344CB8AC3E}">
+        <p14:creationId xmlns:p14="http://schemas.microsoft.com/office/powerpoint/2010/main" val="4068656751"/>
+      </p:ext>
+    </p:extLst>
   </p:cSld>
   <p:clrMapOvr>
     <a:masterClrMapping/>
   </p:clrMapOvr>
-  <mc:AlternateContent xmlns:mc="http://schemas.openxmlformats.org/markup-compatibility/2006">
-    <mc:Choice xmlns:p14="http://schemas.microsoft.com/office/powerpoint/2010/main" Requires="p14">
+  <mc:AlternateContent xmlns:mc="http://schemas.openxmlformats.org/markup-compatibility/2006" xmlns:p14="http://schemas.microsoft.com/office/powerpoint/2010/main">
+    <mc:Choice Requires="p14">
       <p:transition spd="slow">
         <p14:gallery dir="l"/>
       </p:transition>
     </mc:Choice>
-    <mc:Fallback>
+    <mc:Fallback xmlns="">
       <p:transition spd="slow">
         <p:fade/>
       </p:transition>
@@ -6078,6 +6261,131 @@
             <p:ph type="ctrTitle"/>
           </p:nvPr>
         </p:nvSpPr>
+        <p:spPr/>
+        <p:txBody>
+          <a:bodyPr/>
+          <a:lstStyle/>
+          <a:p>
+            <a:r>
+              <a:rPr lang="de-DE" altLang="de-DE" b="1" dirty="0"/>
+              <a:t>Fragen </a:t>
+            </a:r>
+            <a:br>
+              <a:rPr lang="de-DE" altLang="de-DE" b="1" dirty="0"/>
+            </a:br>
+            <a:r>
+              <a:rPr lang="de-DE" altLang="de-DE" b="1" dirty="0"/>
+              <a:t>und </a:t>
+            </a:r>
+            <a:r>
+              <a:rPr lang="de-DE" altLang="de-DE" b="1" dirty="0" smtClean="0"/>
+              <a:t>Bemerkungen?</a:t>
+            </a:r>
+            <a:endParaRPr lang="de-DE" altLang="de-DE" b="1" dirty="0"/>
+          </a:p>
+        </p:txBody>
+      </p:sp>
+      <p:sp>
+        <p:nvSpPr>
+          <p:cNvPr id="2" name="Foliennummernplatzhalter 1"/>
+          <p:cNvSpPr>
+            <a:spLocks noGrp="1"/>
+          </p:cNvSpPr>
+          <p:nvPr>
+            <p:ph type="sldNum" sz="quarter" idx="4"/>
+          </p:nvPr>
+        </p:nvSpPr>
+        <p:spPr/>
+        <p:txBody>
+          <a:bodyPr/>
+          <a:lstStyle/>
+          <a:p>
+            <a:fld id="{3364D7A2-00F1-4267-A931-7AAD54854EE4}" type="slidenum">
+              <a:rPr lang="de-DE" altLang="de-DE" smtClean="0"/>
+              <a:pPr/>
+              <a:t>11</a:t>
+            </a:fld>
+            <a:endParaRPr lang="de-DE" altLang="de-DE"/>
+          </a:p>
+        </p:txBody>
+      </p:sp>
+      <p:sp>
+        <p:nvSpPr>
+          <p:cNvPr id="5" name="Datumsplatzhalter 4"/>
+          <p:cNvSpPr>
+            <a:spLocks noGrp="1"/>
+          </p:cNvSpPr>
+          <p:nvPr>
+            <p:ph type="dt" sz="quarter" idx="2"/>
+          </p:nvPr>
+        </p:nvSpPr>
+        <p:spPr/>
+        <p:txBody>
+          <a:bodyPr/>
+          <a:lstStyle/>
+          <a:p>
+            <a:fld id="{16479477-0FB3-4EC0-B49B-BAAE02E274CF}" type="datetime1">
+              <a:rPr lang="de-DE" altLang="de-DE" smtClean="0"/>
+              <a:t>19.01.2016</a:t>
+            </a:fld>
+            <a:endParaRPr lang="de-DE" altLang="de-DE"/>
+          </a:p>
+        </p:txBody>
+      </p:sp>
+    </p:spTree>
+  </p:cSld>
+  <p:clrMapOvr>
+    <a:masterClrMapping/>
+  </p:clrMapOvr>
+  <mc:AlternateContent xmlns:mc="http://schemas.openxmlformats.org/markup-compatibility/2006" xmlns:p14="http://schemas.microsoft.com/office/powerpoint/2010/main">
+    <mc:Choice Requires="p14">
+      <p:transition spd="slow">
+        <p14:gallery dir="l"/>
+      </p:transition>
+    </mc:Choice>
+    <mc:Fallback xmlns="">
+      <p:transition spd="slow">
+        <p:fade/>
+      </p:transition>
+    </mc:Fallback>
+  </mc:AlternateContent>
+  <p:timing>
+    <p:tnLst>
+      <p:par>
+        <p:cTn id="1" dur="indefinite" restart="never" nodeType="tmRoot"/>
+      </p:par>
+    </p:tnLst>
+  </p:timing>
+</p:sld>
+</file>
+
+<file path=ppt/slides/slide12.xml><?xml version="1.0" encoding="utf-8"?>
+<p:sld xmlns:a="http://schemas.openxmlformats.org/drawingml/2006/main" xmlns:r="http://schemas.openxmlformats.org/officeDocument/2006/relationships" xmlns:p="http://schemas.openxmlformats.org/presentationml/2006/main">
+  <p:cSld>
+    <p:spTree>
+      <p:nvGrpSpPr>
+        <p:cNvPr id="1" name=""/>
+        <p:cNvGrpSpPr/>
+        <p:nvPr/>
+      </p:nvGrpSpPr>
+      <p:grpSpPr>
+        <a:xfrm>
+          <a:off x="0" y="0"/>
+          <a:ext cx="0" cy="0"/>
+          <a:chOff x="0" y="0"/>
+          <a:chExt cx="0" cy="0"/>
+        </a:xfrm>
+      </p:grpSpPr>
+      <p:sp>
+        <p:nvSpPr>
+          <p:cNvPr id="33794" name="Rectangle 2"/>
+          <p:cNvSpPr>
+            <a:spLocks noGrp="1" noChangeArrowheads="1"/>
+          </p:cNvSpPr>
+          <p:nvPr>
+            <p:ph type="ctrTitle"/>
+          </p:nvPr>
+        </p:nvSpPr>
         <p:spPr>
           <a:xfrm>
             <a:off x="1619672" y="2133600"/>
@@ -6114,7 +6422,7 @@
             <a:fld id="{3364D7A2-00F1-4267-A931-7AAD54854EE4}" type="slidenum">
               <a:rPr lang="de-DE" altLang="de-DE" smtClean="0"/>
               <a:pPr/>
-              <a:t>11</a:t>
+              <a:t>12</a:t>
             </a:fld>
             <a:endParaRPr lang="de-DE" altLang="de-DE"/>
           </a:p>
@@ -6137,7 +6445,7 @@
           <a:p>
             <a:fld id="{5E5E9FDC-D07B-4E88-B03F-043EBBB181D8}" type="datetime1">
               <a:rPr lang="de-DE" altLang="de-DE" smtClean="0"/>
-              <a:t>13.01.2016</a:t>
+              <a:t>19.01.2016</a:t>
             </a:fld>
             <a:endParaRPr lang="de-DE" altLang="de-DE"/>
           </a:p>
@@ -6153,13 +6461,13 @@
   <p:clrMapOvr>
     <a:masterClrMapping/>
   </p:clrMapOvr>
-  <mc:AlternateContent xmlns:mc="http://schemas.openxmlformats.org/markup-compatibility/2006">
-    <mc:Choice xmlns:p14="http://schemas.microsoft.com/office/powerpoint/2010/main" Requires="p14">
+  <mc:AlternateContent xmlns:mc="http://schemas.openxmlformats.org/markup-compatibility/2006" xmlns:p14="http://schemas.microsoft.com/office/powerpoint/2010/main">
+    <mc:Choice Requires="p14">
       <p:transition spd="slow">
         <p14:gallery dir="l"/>
       </p:transition>
     </mc:Choice>
-    <mc:Fallback>
+    <mc:Fallback xmlns="">
       <p:transition spd="slow">
         <p:fade/>
       </p:transition>
@@ -6276,8 +6584,23 @@
             </a:pPr>
             <a:r>
               <a:rPr lang="de-DE" dirty="0" smtClean="0"/>
-              <a:t>Vorstellen von Ancient Legends</a:t>
-            </a:r>
+              <a:t>Vorstellen von Ancient </a:t>
+            </a:r>
+            <a:r>
+              <a:rPr lang="de-DE" dirty="0" smtClean="0"/>
+              <a:t>Legends</a:t>
+            </a:r>
+          </a:p>
+          <a:p>
+            <a:pPr marL="514350" indent="-514350">
+              <a:buFont typeface="+mj-lt"/>
+              <a:buAutoNum type="arabicPeriod"/>
+            </a:pPr>
+            <a:r>
+              <a:rPr lang="de-DE" dirty="0" smtClean="0"/>
+              <a:t>Ausblick</a:t>
+            </a:r>
+            <a:endParaRPr lang="de-DE" dirty="0" smtClean="0"/>
           </a:p>
           <a:p>
             <a:pPr marL="514350" indent="-514350">
@@ -6332,7 +6655,7 @@
           <a:p>
             <a:fld id="{AB17A66D-73C4-4D39-A7F9-958E7A4A8CF6}" type="datetime1">
               <a:rPr lang="de-DE" altLang="de-DE" smtClean="0"/>
-              <a:t>13.01.2016</a:t>
+              <a:t>19.01.2016</a:t>
             </a:fld>
             <a:endParaRPr lang="de-DE" altLang="de-DE"/>
           </a:p>
@@ -6348,13 +6671,13 @@
   <p:clrMapOvr>
     <a:masterClrMapping/>
   </p:clrMapOvr>
-  <mc:AlternateContent xmlns:mc="http://schemas.openxmlformats.org/markup-compatibility/2006">
-    <mc:Choice xmlns:p14="http://schemas.microsoft.com/office/powerpoint/2010/main" Requires="p14">
+  <mc:AlternateContent xmlns:mc="http://schemas.openxmlformats.org/markup-compatibility/2006" xmlns:p14="http://schemas.microsoft.com/office/powerpoint/2010/main">
+    <mc:Choice Requires="p14">
       <p:transition spd="slow">
         <p14:gallery dir="l"/>
       </p:transition>
     </mc:Choice>
-    <mc:Fallback>
+    <mc:Fallback xmlns="">
       <p:transition spd="slow">
         <p:fade/>
       </p:transition>
@@ -6495,7 +6818,7 @@
           <a:p>
             <a:fld id="{0839FCAD-4FAA-4E5D-A91E-228084BAE20C}" type="datetime1">
               <a:rPr lang="de-DE" altLang="de-DE" smtClean="0"/>
-              <a:t>13.01.2016</a:t>
+              <a:t>19.01.2016</a:t>
             </a:fld>
             <a:endParaRPr lang="de-DE" altLang="de-DE"/>
           </a:p>
@@ -6506,13 +6829,13 @@
   <p:clrMapOvr>
     <a:masterClrMapping/>
   </p:clrMapOvr>
-  <mc:AlternateContent xmlns:mc="http://schemas.openxmlformats.org/markup-compatibility/2006">
-    <mc:Choice xmlns:p14="http://schemas.microsoft.com/office/powerpoint/2010/main" Requires="p14">
+  <mc:AlternateContent xmlns:mc="http://schemas.openxmlformats.org/markup-compatibility/2006" xmlns:p14="http://schemas.microsoft.com/office/powerpoint/2010/main">
+    <mc:Choice Requires="p14">
       <p:transition spd="slow">
         <p14:gallery dir="l"/>
       </p:transition>
     </mc:Choice>
-    <mc:Fallback>
+    <mc:Fallback xmlns="">
       <p:transition spd="slow">
         <p:fade/>
       </p:transition>
@@ -6802,7 +7125,7 @@
           <a:p>
             <a:fld id="{EA40F3FD-8E3B-4D1D-B45D-7D196F932F39}" type="datetime1">
               <a:rPr lang="de-DE" altLang="de-DE" smtClean="0"/>
-              <a:t>13.01.2016</a:t>
+              <a:t>19.01.2016</a:t>
             </a:fld>
             <a:endParaRPr lang="de-DE" altLang="de-DE"/>
           </a:p>
@@ -6813,13 +7136,13 @@
   <p:clrMapOvr>
     <a:masterClrMapping/>
   </p:clrMapOvr>
-  <mc:AlternateContent xmlns:mc="http://schemas.openxmlformats.org/markup-compatibility/2006">
-    <mc:Choice xmlns:p14="http://schemas.microsoft.com/office/powerpoint/2010/main" Requires="p14">
+  <mc:AlternateContent xmlns:mc="http://schemas.openxmlformats.org/markup-compatibility/2006" xmlns:p14="http://schemas.microsoft.com/office/powerpoint/2010/main">
+    <mc:Choice Requires="p14">
       <p:transition spd="slow">
         <p14:gallery dir="l"/>
       </p:transition>
     </mc:Choice>
-    <mc:Fallback>
+    <mc:Fallback xmlns="">
       <p:transition spd="slow">
         <p:fade/>
       </p:transition>
@@ -6976,7 +7299,6 @@
               <a:rPr lang="de-DE" altLang="de-DE" sz="2000" dirty="0" smtClean="0"/>
               <a:t>Spielkarten erstellen</a:t>
             </a:r>
-            <a:endParaRPr lang="de-DE" altLang="de-DE" sz="2000" dirty="0" smtClean="0"/>
           </a:p>
           <a:p>
             <a:pPr lvl="1">
@@ -7071,7 +7393,7 @@
           <a:p>
             <a:fld id="{04A0CC20-74DE-410B-9D1A-50F7468D956A}" type="datetime1">
               <a:rPr lang="de-DE" altLang="de-DE" smtClean="0"/>
-              <a:t>13.01.2016</a:t>
+              <a:t>19.01.2016</a:t>
             </a:fld>
             <a:endParaRPr lang="de-DE" altLang="de-DE"/>
           </a:p>
@@ -7087,13 +7409,13 @@
   <p:clrMapOvr>
     <a:masterClrMapping/>
   </p:clrMapOvr>
-  <mc:AlternateContent xmlns:mc="http://schemas.openxmlformats.org/markup-compatibility/2006">
-    <mc:Choice xmlns:p14="http://schemas.microsoft.com/office/powerpoint/2010/main" Requires="p14">
+  <mc:AlternateContent xmlns:mc="http://schemas.openxmlformats.org/markup-compatibility/2006" xmlns:p14="http://schemas.microsoft.com/office/powerpoint/2010/main">
+    <mc:Choice Requires="p14">
       <p:transition spd="slow">
         <p14:gallery dir="l"/>
       </p:transition>
     </mc:Choice>
-    <mc:Fallback>
+    <mc:Fallback xmlns="">
       <p:transition spd="slow">
         <p:fade/>
       </p:transition>
@@ -7221,7 +7543,6 @@
               <a:rPr lang="de-DE" altLang="de-DE" sz="2400" dirty="0" smtClean="0"/>
               <a:t>Im Spiel soll ein pausierendes Menü geöffnet werden können, worin</a:t>
             </a:r>
-            <a:endParaRPr lang="de-DE" altLang="de-DE" sz="2400" dirty="0" smtClean="0"/>
           </a:p>
           <a:p>
             <a:pPr lvl="1">
@@ -7348,7 +7669,7 @@
           <a:p>
             <a:fld id="{CBD4E7FC-E4C5-4224-8100-44760F896C9F}" type="datetime1">
               <a:rPr lang="de-DE" altLang="de-DE" smtClean="0"/>
-              <a:t>13.01.2016</a:t>
+              <a:t>19.01.2016</a:t>
             </a:fld>
             <a:endParaRPr lang="de-DE" altLang="de-DE"/>
           </a:p>
@@ -7364,13 +7685,13 @@
   <p:clrMapOvr>
     <a:masterClrMapping/>
   </p:clrMapOvr>
-  <mc:AlternateContent xmlns:mc="http://schemas.openxmlformats.org/markup-compatibility/2006">
-    <mc:Choice xmlns:p14="http://schemas.microsoft.com/office/powerpoint/2010/main" Requires="p14">
+  <mc:AlternateContent xmlns:mc="http://schemas.openxmlformats.org/markup-compatibility/2006" xmlns:p14="http://schemas.microsoft.com/office/powerpoint/2010/main">
+    <mc:Choice Requires="p14">
       <p:transition spd="slow">
         <p14:gallery dir="l"/>
       </p:transition>
     </mc:Choice>
-    <mc:Fallback>
+    <mc:Fallback xmlns="">
       <p:transition spd="slow">
         <p:fade/>
       </p:transition>
@@ -7517,7 +7838,7 @@
           <a:p>
             <a:fld id="{6A78C2BB-03FA-4B0B-B6B1-6557BDC7739F}" type="datetime1">
               <a:rPr lang="de-DE" altLang="de-DE" smtClean="0"/>
-              <a:t>13.01.2016</a:t>
+              <a:t>19.01.2016</a:t>
             </a:fld>
             <a:endParaRPr lang="de-DE" altLang="de-DE"/>
           </a:p>
@@ -7528,13 +7849,13 @@
   <p:clrMapOvr>
     <a:masterClrMapping/>
   </p:clrMapOvr>
-  <mc:AlternateContent xmlns:mc="http://schemas.openxmlformats.org/markup-compatibility/2006">
-    <mc:Choice xmlns:p14="http://schemas.microsoft.com/office/powerpoint/2010/main" Requires="p14">
+  <mc:AlternateContent xmlns:mc="http://schemas.openxmlformats.org/markup-compatibility/2006" xmlns:p14="http://schemas.microsoft.com/office/powerpoint/2010/main">
+    <mc:Choice Requires="p14">
       <p:transition spd="slow">
         <p14:gallery dir="l"/>
       </p:transition>
     </mc:Choice>
-    <mc:Fallback>
+    <mc:Fallback xmlns="">
       <p:transition spd="slow">
         <p:fade/>
       </p:transition>
@@ -7711,7 +8032,7 @@
           <a:p>
             <a:fld id="{88848E1F-B09B-423A-99BF-D02498DB76CD}" type="datetime1">
               <a:rPr lang="de-DE" altLang="de-DE" smtClean="0"/>
-              <a:t>13.01.2016</a:t>
+              <a:t>19.01.2016</a:t>
             </a:fld>
             <a:endParaRPr lang="de-DE" altLang="de-DE"/>
           </a:p>
@@ -7722,13 +8043,13 @@
   <p:clrMapOvr>
     <a:masterClrMapping/>
   </p:clrMapOvr>
-  <mc:AlternateContent xmlns:mc="http://schemas.openxmlformats.org/markup-compatibility/2006">
-    <mc:Choice xmlns:p14="http://schemas.microsoft.com/office/powerpoint/2010/main" Requires="p14">
+  <mc:AlternateContent xmlns:mc="http://schemas.openxmlformats.org/markup-compatibility/2006" xmlns:p14="http://schemas.microsoft.com/office/powerpoint/2010/main">
+    <mc:Choice Requires="p14">
       <p:transition spd="slow">
         <p14:gallery dir="l"/>
       </p:transition>
     </mc:Choice>
-    <mc:Fallback>
+    <mc:Fallback xmlns="">
       <p:transition spd="slow">
         <p:fade/>
       </p:transition>
@@ -7825,7 +8146,7 @@
           <a:p>
             <a:fld id="{6E58D5AF-0CF4-47DD-8EB1-C4F2D84E9E60}" type="datetime1">
               <a:rPr lang="de-DE" altLang="de-DE" smtClean="0"/>
-              <a:t>13.01.2016</a:t>
+              <a:t>19.01.2016</a:t>
             </a:fld>
             <a:endParaRPr lang="de-DE" altLang="de-DE"/>
           </a:p>
@@ -7836,13 +8157,13 @@
   <p:clrMapOvr>
     <a:masterClrMapping/>
   </p:clrMapOvr>
-  <mc:AlternateContent xmlns:mc="http://schemas.openxmlformats.org/markup-compatibility/2006">
-    <mc:Choice xmlns:p14="http://schemas.microsoft.com/office/powerpoint/2010/main" Requires="p14">
+  <mc:AlternateContent xmlns:mc="http://schemas.openxmlformats.org/markup-compatibility/2006" xmlns:p14="http://schemas.microsoft.com/office/powerpoint/2010/main">
+    <mc:Choice Requires="p14">
       <p:transition spd="slow">
         <p14:gallery dir="l"/>
       </p:transition>
     </mc:Choice>
-    <mc:Fallback>
+    <mc:Fallback xmlns="">
       <p:transition spd="slow">
         <p:fade/>
       </p:transition>

</xml_diff>

<commit_message>
Kosten für Upgrades im Hauptgebäude und ebenfalls ToolTipp für Upgrades
</commit_message>
<xml_diff>
--- a/docs/Präsentation/2D RTS-Spiel (Ancient Legends).pptx
+++ b/docs/Präsentation/2D RTS-Spiel (Ancient Legends).pptx
@@ -151,6 +151,36 @@
       </a:defRPr>
     </a:lvl9pPr>
   </p:defaultTextStyle>
+  <p:extLst>
+    <p:ext uri="{EFAFB233-063F-42B5-8137-9DF3F51BA10A}">
+      <p15:sldGuideLst xmlns:p15="http://schemas.microsoft.com/office/powerpoint/2012/main">
+        <p15:guide id="1" orient="horz" pos="2160">
+          <p15:clr>
+            <a:srgbClr val="A4A3A4"/>
+          </p15:clr>
+        </p15:guide>
+        <p15:guide id="2" pos="2880">
+          <p15:clr>
+            <a:srgbClr val="A4A3A4"/>
+          </p15:clr>
+        </p15:guide>
+      </p15:sldGuideLst>
+    </p:ext>
+    <p:ext uri="{2D200454-40CA-4A62-9FC3-DE9A4176ACB9}">
+      <p15:notesGuideLst xmlns:p15="http://schemas.microsoft.com/office/powerpoint/2012/main">
+        <p15:guide id="1" orient="horz" pos="2924">
+          <p15:clr>
+            <a:srgbClr val="A4A3A4"/>
+          </p15:clr>
+        </p15:guide>
+        <p15:guide id="2" pos="2188">
+          <p15:clr>
+            <a:srgbClr val="A4A3A4"/>
+          </p15:clr>
+        </p15:guide>
+      </p15:notesGuideLst>
+    </p:ext>
+  </p:extLst>
 </p:presentation>
 </file>
 
@@ -1161,6 +1191,11 @@
         </p:txBody>
       </p:sp>
     </p:spTree>
+    <p:extLst>
+      <p:ext uri="{BB962C8B-B14F-4D97-AF65-F5344CB8AC3E}">
+        <p14:creationId xmlns:p14="http://schemas.microsoft.com/office/powerpoint/2010/main" val="4147135827"/>
+      </p:ext>
+    </p:extLst>
   </p:cSld>
   <p:clrMapOvr>
     <a:masterClrMapping/>
@@ -1296,6 +1331,11 @@
         </p:txBody>
       </p:sp>
     </p:spTree>
+    <p:extLst>
+      <p:ext uri="{BB962C8B-B14F-4D97-AF65-F5344CB8AC3E}">
+        <p14:creationId xmlns:p14="http://schemas.microsoft.com/office/powerpoint/2010/main" val="2191409301"/>
+      </p:ext>
+    </p:extLst>
   </p:cSld>
   <p:clrMapOvr>
     <a:masterClrMapping/>
@@ -1384,6 +1424,11 @@
         </p:txBody>
       </p:sp>
     </p:spTree>
+    <p:extLst>
+      <p:ext uri="{BB962C8B-B14F-4D97-AF65-F5344CB8AC3E}">
+        <p14:creationId xmlns:p14="http://schemas.microsoft.com/office/powerpoint/2010/main" val="2110156388"/>
+      </p:ext>
+    </p:extLst>
   </p:cSld>
   <p:clrMapOvr>
     <a:masterClrMapping/>
@@ -1472,6 +1517,11 @@
         </p:txBody>
       </p:sp>
     </p:spTree>
+    <p:extLst>
+      <p:ext uri="{BB962C8B-B14F-4D97-AF65-F5344CB8AC3E}">
+        <p14:creationId xmlns:p14="http://schemas.microsoft.com/office/powerpoint/2010/main" val="1592518155"/>
+      </p:ext>
+    </p:extLst>
   </p:cSld>
   <p:clrMapOvr>
     <a:masterClrMapping/>
@@ -1531,11 +1581,19 @@
           <a:p>
             <a:r>
               <a:rPr lang="de-DE" dirty="0" smtClean="0"/>
-              <a:t>Bei 6. </a:t>
+              <a:t>Bei </a:t>
+            </a:r>
+            <a:r>
+              <a:rPr lang="de-DE" dirty="0" smtClean="0"/>
+              <a:t>7. </a:t>
             </a:r>
             <a:r>
               <a:rPr lang="de-DE" baseline="0" dirty="0" smtClean="0"/>
-              <a:t> Sagen Fragen können am Schluss gestellt werden aber sie können auch mit einem Handzeichen jederzeit Fragen stellen.</a:t>
+              <a:t> </a:t>
+            </a:r>
+            <a:r>
+              <a:rPr lang="de-DE" baseline="0" dirty="0" smtClean="0"/>
+              <a:t>Sagen Fragen können am Schluss gestellt werden aber sie können auch mit einem Handzeichen jederzeit Fragen stellen.</a:t>
             </a:r>
           </a:p>
         </p:txBody>
@@ -1658,6 +1716,11 @@
         </p:txBody>
       </p:sp>
     </p:spTree>
+    <p:extLst>
+      <p:ext uri="{BB962C8B-B14F-4D97-AF65-F5344CB8AC3E}">
+        <p14:creationId xmlns:p14="http://schemas.microsoft.com/office/powerpoint/2010/main" val="3149612971"/>
+      </p:ext>
+    </p:extLst>
   </p:cSld>
   <p:clrMapOvr>
     <a:masterClrMapping/>
@@ -1756,6 +1819,11 @@
         </p:txBody>
       </p:sp>
     </p:spTree>
+    <p:extLst>
+      <p:ext uri="{BB962C8B-B14F-4D97-AF65-F5344CB8AC3E}">
+        <p14:creationId xmlns:p14="http://schemas.microsoft.com/office/powerpoint/2010/main" val="2813722173"/>
+      </p:ext>
+    </p:extLst>
   </p:cSld>
   <p:clrMapOvr>
     <a:masterClrMapping/>
@@ -1891,6 +1959,11 @@
         </p:txBody>
       </p:sp>
     </p:spTree>
+    <p:extLst>
+      <p:ext uri="{BB962C8B-B14F-4D97-AF65-F5344CB8AC3E}">
+        <p14:creationId xmlns:p14="http://schemas.microsoft.com/office/powerpoint/2010/main" val="3180051724"/>
+      </p:ext>
+    </p:extLst>
   </p:cSld>
   <p:clrMapOvr>
     <a:masterClrMapping/>
@@ -2026,6 +2099,11 @@
         </p:txBody>
       </p:sp>
     </p:spTree>
+    <p:extLst>
+      <p:ext uri="{BB962C8B-B14F-4D97-AF65-F5344CB8AC3E}">
+        <p14:creationId xmlns:p14="http://schemas.microsoft.com/office/powerpoint/2010/main" val="694074003"/>
+      </p:ext>
+    </p:extLst>
   </p:cSld>
   <p:clrMapOvr>
     <a:masterClrMapping/>
@@ -2161,6 +2239,11 @@
         </p:txBody>
       </p:sp>
     </p:spTree>
+    <p:extLst>
+      <p:ext uri="{BB962C8B-B14F-4D97-AF65-F5344CB8AC3E}">
+        <p14:creationId xmlns:p14="http://schemas.microsoft.com/office/powerpoint/2010/main" val="2253112936"/>
+      </p:ext>
+    </p:extLst>
   </p:cSld>
   <p:clrMapOvr>
     <a:masterClrMapping/>
@@ -2296,6 +2379,11 @@
         </p:txBody>
       </p:sp>
     </p:spTree>
+    <p:extLst>
+      <p:ext uri="{BB962C8B-B14F-4D97-AF65-F5344CB8AC3E}">
+        <p14:creationId xmlns:p14="http://schemas.microsoft.com/office/powerpoint/2010/main" val="3729656774"/>
+      </p:ext>
+    </p:extLst>
   </p:cSld>
   <p:clrMapOvr>
     <a:masterClrMapping/>
@@ -2380,6 +2468,11 @@
         </p:txBody>
       </p:sp>
     </p:spTree>
+    <p:extLst>
+      <p:ext uri="{BB962C8B-B14F-4D97-AF65-F5344CB8AC3E}">
+        <p14:creationId xmlns:p14="http://schemas.microsoft.com/office/powerpoint/2010/main" val="1636988021"/>
+      </p:ext>
+    </p:extLst>
   </p:cSld>
   <p:clrMapOvr>
     <a:masterClrMapping/>
@@ -6584,11 +6677,7 @@
             </a:pPr>
             <a:r>
               <a:rPr lang="de-DE" dirty="0" smtClean="0"/>
-              <a:t>Vorstellen von Ancient </a:t>
-            </a:r>
-            <a:r>
-              <a:rPr lang="de-DE" dirty="0" smtClean="0"/>
-              <a:t>Legends</a:t>
+              <a:t>Vorstellen von Ancient Legends</a:t>
             </a:r>
           </a:p>
           <a:p>
@@ -6600,7 +6689,6 @@
               <a:rPr lang="de-DE" dirty="0" smtClean="0"/>
               <a:t>Ausblick</a:t>
             </a:r>
-            <a:endParaRPr lang="de-DE" dirty="0" smtClean="0"/>
           </a:p>
           <a:p>
             <a:pPr marL="514350" indent="-514350">
@@ -7771,7 +7859,15 @@
             <a:pPr lvl="1"/>
             <a:r>
               <a:rPr lang="de-DE" altLang="de-DE" sz="2000" dirty="0" smtClean="0"/>
-              <a:t>Gebäude können nicht ausgebaut werden und keine Verbesserungen erforschen</a:t>
+              <a:t>Gebäude können </a:t>
+            </a:r>
+            <a:r>
+              <a:rPr lang="de-DE" altLang="de-DE" sz="2000" dirty="0" smtClean="0"/>
+              <a:t>keine </a:t>
+            </a:r>
+            <a:r>
+              <a:rPr lang="de-DE" altLang="de-DE" sz="2000" dirty="0" smtClean="0"/>
+              <a:t>Verbesserungen erforschen</a:t>
             </a:r>
           </a:p>
           <a:p>

</xml_diff>

<commit_message>
Änderungen an der Präsentation
</commit_message>
<xml_diff>
--- a/docs/Präsentation/2D RTS-Spiel (Ancient Legends).pptx
+++ b/docs/Präsentation/2D RTS-Spiel (Ancient Legends).pptx
@@ -1581,19 +1581,11 @@
           <a:p>
             <a:r>
               <a:rPr lang="de-DE" dirty="0" smtClean="0"/>
-              <a:t>Bei </a:t>
-            </a:r>
-            <a:r>
-              <a:rPr lang="de-DE" dirty="0" smtClean="0"/>
-              <a:t>7. </a:t>
+              <a:t>Bei 7. </a:t>
             </a:r>
             <a:r>
               <a:rPr lang="de-DE" baseline="0" dirty="0" smtClean="0"/>
-              <a:t> </a:t>
-            </a:r>
-            <a:r>
-              <a:rPr lang="de-DE" baseline="0" dirty="0" smtClean="0"/>
-              <a:t>Sagen Fragen können am Schluss gestellt werden aber sie können auch mit einem Handzeichen jederzeit Fragen stellen.</a:t>
+              <a:t> Sagen Fragen können am Schluss gestellt werden aber sie können auch mit einem Handzeichen jederzeit Fragen stellen.</a:t>
             </a:r>
           </a:p>
         </p:txBody>
@@ -7859,16 +7851,20 @@
             <a:pPr lvl="1"/>
             <a:r>
               <a:rPr lang="de-DE" altLang="de-DE" sz="2000" dirty="0" smtClean="0"/>
-              <a:t>Gebäude können </a:t>
+              <a:t>Gebäude können keine Verbesserungen </a:t>
             </a:r>
             <a:r>
               <a:rPr lang="de-DE" altLang="de-DE" sz="2000" dirty="0" smtClean="0"/>
-              <a:t>keine </a:t>
-            </a:r>
+              <a:t>erforschen</a:t>
+            </a:r>
+          </a:p>
+          <a:p>
+            <a:pPr lvl="1"/>
             <a:r>
               <a:rPr lang="de-DE" altLang="de-DE" sz="2000" dirty="0" smtClean="0"/>
-              <a:t>Verbesserungen erforschen</a:t>
-            </a:r>
+              <a:t>Einheiten können eine Speziellen Fähigkeiten verwenden</a:t>
+            </a:r>
+            <a:endParaRPr lang="de-DE" altLang="de-DE" sz="2000" dirty="0" smtClean="0"/>
           </a:p>
           <a:p>
             <a:r>

</xml_diff>